<commit_message>
update fig 2 and 3 in manuscript for axis x with gradient
</commit_message>
<xml_diff>
--- a/relatedocuments/Chapt1_conceptualfig.pptx
+++ b/relatedocuments/Chapt1_conceptualfig.pptx
@@ -5,10 +5,12 @@
     <p:sldMasterId id="2147483648" r:id="rId1"/>
   </p:sldMasterIdLst>
   <p:notesMasterIdLst>
-    <p:notesMasterId r:id="rId3"/>
+    <p:notesMasterId r:id="rId5"/>
   </p:notesMasterIdLst>
   <p:sldIdLst>
     <p:sldId id="257" r:id="rId2"/>
+    <p:sldId id="258" r:id="rId3"/>
+    <p:sldId id="259" r:id="rId4"/>
   </p:sldIdLst>
   <p:sldSz cx="12192000" cy="6858000"/>
   <p:notesSz cx="6858000" cy="9144000"/>
@@ -111,6 +113,9 @@
     <p:ext uri="{EFAFB233-063F-42B5-8137-9DF3F51BA10A}">
       <p15:sldGuideLst xmlns:p15="http://schemas.microsoft.com/office/powerpoint/2012/main"/>
     </p:ext>
+    <p:ext uri="{2D200454-40CA-4A62-9FC3-DE9A4176ACB9}">
+      <p15:notesGuideLst xmlns:p15="http://schemas.microsoft.com/office/powerpoint/2012/main"/>
+    </p:ext>
   </p:extLst>
 </p:presentation>
 </file>
@@ -197,7 +202,7 @@
           <a:p>
             <a:fld id="{385B58D3-3A08-D94A-9131-73EA1863793E}" type="datetimeFigureOut">
               <a:rPr lang="en-US" smtClean="0"/>
-              <a:t>9/13/23</a:t>
+              <a:t>12/11/23</a:t>
             </a:fld>
             <a:endParaRPr lang="en-US"/>
           </a:p>
@@ -549,6 +554,90 @@
 </p:notes>
 </file>
 
+<file path=ppt/notesSlides/notesSlide2.xml><?xml version="1.0" encoding="utf-8"?>
+<p:notes xmlns:a="http://schemas.openxmlformats.org/drawingml/2006/main" xmlns:r="http://schemas.openxmlformats.org/officeDocument/2006/relationships" xmlns:p="http://schemas.openxmlformats.org/presentationml/2006/main">
+  <p:cSld>
+    <p:spTree>
+      <p:nvGrpSpPr>
+        <p:cNvPr id="1" name=""/>
+        <p:cNvGrpSpPr/>
+        <p:nvPr/>
+      </p:nvGrpSpPr>
+      <p:grpSpPr>
+        <a:xfrm>
+          <a:off x="0" y="0"/>
+          <a:ext cx="0" cy="0"/>
+          <a:chOff x="0" y="0"/>
+          <a:chExt cx="0" cy="0"/>
+        </a:xfrm>
+      </p:grpSpPr>
+      <p:sp>
+        <p:nvSpPr>
+          <p:cNvPr id="2" name="Slide Image Placeholder 1"/>
+          <p:cNvSpPr>
+            <a:spLocks noGrp="1" noRot="1" noChangeAspect="1"/>
+          </p:cNvSpPr>
+          <p:nvPr>
+            <p:ph type="sldImg"/>
+          </p:nvPr>
+        </p:nvSpPr>
+        <p:spPr/>
+      </p:sp>
+      <p:sp>
+        <p:nvSpPr>
+          <p:cNvPr id="3" name="Notes Placeholder 2"/>
+          <p:cNvSpPr>
+            <a:spLocks noGrp="1"/>
+          </p:cNvSpPr>
+          <p:nvPr>
+            <p:ph type="body" idx="1"/>
+          </p:nvPr>
+        </p:nvSpPr>
+        <p:spPr/>
+        <p:txBody>
+          <a:bodyPr/>
+          <a:lstStyle/>
+          <a:p>
+            <a:endParaRPr lang="en-US"/>
+          </a:p>
+        </p:txBody>
+      </p:sp>
+      <p:sp>
+        <p:nvSpPr>
+          <p:cNvPr id="4" name="Slide Number Placeholder 3"/>
+          <p:cNvSpPr>
+            <a:spLocks noGrp="1"/>
+          </p:cNvSpPr>
+          <p:nvPr>
+            <p:ph type="sldNum" sz="quarter" idx="5"/>
+          </p:nvPr>
+        </p:nvSpPr>
+        <p:spPr/>
+        <p:txBody>
+          <a:bodyPr/>
+          <a:lstStyle/>
+          <a:p>
+            <a:fld id="{9910859B-E1F6-D74B-9CCC-5C4B5D2CEA30}" type="slidenum">
+              <a:rPr lang="en-US" smtClean="0"/>
+              <a:t>2</a:t>
+            </a:fld>
+            <a:endParaRPr lang="en-US"/>
+          </a:p>
+        </p:txBody>
+      </p:sp>
+    </p:spTree>
+    <p:extLst>
+      <p:ext uri="{BB962C8B-B14F-4D97-AF65-F5344CB8AC3E}">
+        <p14:creationId xmlns:p14="http://schemas.microsoft.com/office/powerpoint/2010/main" val="3302590495"/>
+      </p:ext>
+    </p:extLst>
+  </p:cSld>
+  <p:clrMapOvr>
+    <a:masterClrMapping/>
+  </p:clrMapOvr>
+</p:notes>
+</file>
+
 <file path=ppt/slideLayouts/slideLayout1.xml><?xml version="1.0" encoding="utf-8"?>
 <p:sldLayout xmlns:a="http://schemas.openxmlformats.org/drawingml/2006/main" xmlns:r="http://schemas.openxmlformats.org/officeDocument/2006/relationships" xmlns:p="http://schemas.openxmlformats.org/presentationml/2006/main" type="title" preserve="1">
   <p:cSld name="Title Slide">
@@ -698,7 +787,7 @@
           <a:p>
             <a:fld id="{1D8E0F60-F98E-E04E-8062-CC04F8BA2750}" type="datetimeFigureOut">
               <a:rPr lang="en-US" smtClean="0"/>
-              <a:t>9/13/23</a:t>
+              <a:t>12/11/23</a:t>
             </a:fld>
             <a:endParaRPr lang="en-US"/>
           </a:p>
@@ -898,7 +987,7 @@
           <a:p>
             <a:fld id="{1D8E0F60-F98E-E04E-8062-CC04F8BA2750}" type="datetimeFigureOut">
               <a:rPr lang="en-US" smtClean="0"/>
-              <a:t>9/13/23</a:t>
+              <a:t>12/11/23</a:t>
             </a:fld>
             <a:endParaRPr lang="en-US"/>
           </a:p>
@@ -1108,7 +1197,7 @@
           <a:p>
             <a:fld id="{1D8E0F60-F98E-E04E-8062-CC04F8BA2750}" type="datetimeFigureOut">
               <a:rPr lang="en-US" smtClean="0"/>
-              <a:t>9/13/23</a:t>
+              <a:t>12/11/23</a:t>
             </a:fld>
             <a:endParaRPr lang="en-US"/>
           </a:p>
@@ -1308,7 +1397,7 @@
           <a:p>
             <a:fld id="{1D8E0F60-F98E-E04E-8062-CC04F8BA2750}" type="datetimeFigureOut">
               <a:rPr lang="en-US" smtClean="0"/>
-              <a:t>9/13/23</a:t>
+              <a:t>12/11/23</a:t>
             </a:fld>
             <a:endParaRPr lang="en-US"/>
           </a:p>
@@ -1584,7 +1673,7 @@
           <a:p>
             <a:fld id="{1D8E0F60-F98E-E04E-8062-CC04F8BA2750}" type="datetimeFigureOut">
               <a:rPr lang="en-US" smtClean="0"/>
-              <a:t>9/13/23</a:t>
+              <a:t>12/11/23</a:t>
             </a:fld>
             <a:endParaRPr lang="en-US"/>
           </a:p>
@@ -1852,7 +1941,7 @@
           <a:p>
             <a:fld id="{1D8E0F60-F98E-E04E-8062-CC04F8BA2750}" type="datetimeFigureOut">
               <a:rPr lang="en-US" smtClean="0"/>
-              <a:t>9/13/23</a:t>
+              <a:t>12/11/23</a:t>
             </a:fld>
             <a:endParaRPr lang="en-US"/>
           </a:p>
@@ -2267,7 +2356,7 @@
           <a:p>
             <a:fld id="{1D8E0F60-F98E-E04E-8062-CC04F8BA2750}" type="datetimeFigureOut">
               <a:rPr lang="en-US" smtClean="0"/>
-              <a:t>9/13/23</a:t>
+              <a:t>12/11/23</a:t>
             </a:fld>
             <a:endParaRPr lang="en-US"/>
           </a:p>
@@ -2409,7 +2498,7 @@
           <a:p>
             <a:fld id="{1D8E0F60-F98E-E04E-8062-CC04F8BA2750}" type="datetimeFigureOut">
               <a:rPr lang="en-US" smtClean="0"/>
-              <a:t>9/13/23</a:t>
+              <a:t>12/11/23</a:t>
             </a:fld>
             <a:endParaRPr lang="en-US"/>
           </a:p>
@@ -2522,7 +2611,7 @@
           <a:p>
             <a:fld id="{1D8E0F60-F98E-E04E-8062-CC04F8BA2750}" type="datetimeFigureOut">
               <a:rPr lang="en-US" smtClean="0"/>
-              <a:t>9/13/23</a:t>
+              <a:t>12/11/23</a:t>
             </a:fld>
             <a:endParaRPr lang="en-US"/>
           </a:p>
@@ -2835,7 +2924,7 @@
           <a:p>
             <a:fld id="{1D8E0F60-F98E-E04E-8062-CC04F8BA2750}" type="datetimeFigureOut">
               <a:rPr lang="en-US" smtClean="0"/>
-              <a:t>9/13/23</a:t>
+              <a:t>12/11/23</a:t>
             </a:fld>
             <a:endParaRPr lang="en-US"/>
           </a:p>
@@ -3124,7 +3213,7 @@
           <a:p>
             <a:fld id="{1D8E0F60-F98E-E04E-8062-CC04F8BA2750}" type="datetimeFigureOut">
               <a:rPr lang="en-US" smtClean="0"/>
-              <a:t>9/13/23</a:t>
+              <a:t>12/11/23</a:t>
             </a:fld>
             <a:endParaRPr lang="en-US"/>
           </a:p>
@@ -3367,7 +3456,7 @@
           <a:p>
             <a:fld id="{1D8E0F60-F98E-E04E-8062-CC04F8BA2750}" type="datetimeFigureOut">
               <a:rPr lang="en-US" smtClean="0"/>
-              <a:t>9/13/23</a:t>
+              <a:t>12/11/23</a:t>
             </a:fld>
             <a:endParaRPr lang="en-US"/>
           </a:p>
@@ -3976,8 +4065,8 @@
             <a:solidFill>
               <a:schemeClr val="tx1"/>
             </a:solidFill>
-            <a:headEnd type="none"/>
-            <a:tailEnd type="triangle"/>
+            <a:headEnd type="triangle"/>
+            <a:tailEnd type="none"/>
           </a:ln>
         </p:spPr>
         <p:style>
@@ -4104,8 +4193,8 @@
             <a:solidFill>
               <a:schemeClr val="tx1"/>
             </a:solidFill>
-            <a:headEnd type="none"/>
-            <a:tailEnd type="triangle"/>
+            <a:headEnd type="triangle"/>
+            <a:tailEnd type="none"/>
           </a:ln>
         </p:spPr>
         <p:style>
@@ -4225,8 +4314,8 @@
             <a:solidFill>
               <a:schemeClr val="tx1"/>
             </a:solidFill>
-            <a:headEnd type="none"/>
-            <a:tailEnd type="triangle"/>
+            <a:headEnd type="triangle"/>
+            <a:tailEnd type="none"/>
           </a:ln>
         </p:spPr>
         <p:style>
@@ -4385,8 +4474,8 @@
             <a:solidFill>
               <a:schemeClr val="tx1"/>
             </a:solidFill>
-            <a:headEnd type="none"/>
-            <a:tailEnd type="triangle"/>
+            <a:headEnd type="triangle"/>
+            <a:tailEnd type="none"/>
           </a:ln>
         </p:spPr>
         <p:style>
@@ -4799,8 +4888,8 @@
             <a:solidFill>
               <a:schemeClr val="tx1"/>
             </a:solidFill>
-            <a:headEnd type="none"/>
-            <a:tailEnd type="triangle"/>
+            <a:headEnd type="triangle"/>
+            <a:tailEnd type="none"/>
           </a:ln>
         </p:spPr>
         <p:style>
@@ -4846,8 +4935,8 @@
             <a:solidFill>
               <a:schemeClr val="tx1"/>
             </a:solidFill>
-            <a:headEnd type="none"/>
-            <a:tailEnd type="triangle"/>
+            <a:headEnd type="triangle"/>
+            <a:tailEnd type="none"/>
           </a:ln>
         </p:spPr>
         <p:style>
@@ -4893,8 +4982,8 @@
             <a:solidFill>
               <a:schemeClr val="tx1"/>
             </a:solidFill>
-            <a:headEnd type="none"/>
-            <a:tailEnd type="triangle"/>
+            <a:headEnd type="triangle"/>
+            <a:tailEnd type="none"/>
           </a:ln>
         </p:spPr>
         <p:style>
@@ -5045,8 +5134,8 @@
             <a:solidFill>
               <a:schemeClr val="tx1"/>
             </a:solidFill>
-            <a:headEnd type="none"/>
-            <a:tailEnd type="triangle"/>
+            <a:headEnd type="triangle"/>
+            <a:tailEnd type="none"/>
           </a:ln>
         </p:spPr>
         <p:style>
@@ -5280,8 +5369,8 @@
             <a:solidFill>
               <a:schemeClr val="tx1"/>
             </a:solidFill>
-            <a:headEnd type="none"/>
-            <a:tailEnd type="triangle"/>
+            <a:headEnd type="triangle"/>
+            <a:tailEnd type="none"/>
           </a:ln>
         </p:spPr>
         <p:style>
@@ -5564,8 +5653,8 @@
             <a:solidFill>
               <a:schemeClr val="tx1"/>
             </a:solidFill>
-            <a:headEnd type="none"/>
-            <a:tailEnd type="triangle"/>
+            <a:headEnd type="triangle"/>
+            <a:tailEnd type="none"/>
           </a:ln>
         </p:spPr>
         <p:style>
@@ -6259,7 +6348,7 @@
             </p:nvSpPr>
             <p:spPr>
               <a:xfrm>
-                <a:off x="47741" y="4356396"/>
+                <a:off x="147065" y="4356396"/>
                 <a:ext cx="8352735" cy="2491901"/>
               </a:xfrm>
               <a:prstGeom prst="rect">
@@ -6564,7 +6653,7 @@
             </p:nvSpPr>
             <p:spPr>
               <a:xfrm>
-                <a:off x="47741" y="4356396"/>
+                <a:off x="147065" y="4356396"/>
                 <a:ext cx="8352735" cy="2491901"/>
               </a:xfrm>
               <a:prstGeom prst="rect">
@@ -6671,7 +6760,7 @@
               <a:schemeClr val="tx1"/>
             </a:solidFill>
             <a:headEnd type="none"/>
-            <a:tailEnd type="triangle"/>
+            <a:tailEnd type="none"/>
           </a:ln>
         </p:spPr>
         <p:style>
@@ -6716,7 +6805,7 @@
               <a:schemeClr val="tx1"/>
             </a:solidFill>
             <a:headEnd type="none"/>
-            <a:tailEnd type="triangle"/>
+            <a:tailEnd type="none"/>
           </a:ln>
         </p:spPr>
         <p:style>
@@ -7080,6 +7169,662 @@
     <p:extLst>
       <p:ext uri="{BB962C8B-B14F-4D97-AF65-F5344CB8AC3E}">
         <p14:creationId xmlns:p14="http://schemas.microsoft.com/office/powerpoint/2010/main" val="2872016306"/>
+      </p:ext>
+    </p:extLst>
+  </p:cSld>
+  <p:clrMapOvr>
+    <a:masterClrMapping/>
+  </p:clrMapOvr>
+</p:sld>
+</file>
+
+<file path=ppt/slides/slide2.xml><?xml version="1.0" encoding="utf-8"?>
+<p:sld xmlns:a="http://schemas.openxmlformats.org/drawingml/2006/main" xmlns:r="http://schemas.openxmlformats.org/officeDocument/2006/relationships" xmlns:p="http://schemas.openxmlformats.org/presentationml/2006/main">
+  <p:cSld>
+    <p:spTree>
+      <p:nvGrpSpPr>
+        <p:cNvPr id="1" name=""/>
+        <p:cNvGrpSpPr/>
+        <p:nvPr/>
+      </p:nvGrpSpPr>
+      <p:grpSpPr>
+        <a:xfrm>
+          <a:off x="0" y="0"/>
+          <a:ext cx="0" cy="0"/>
+          <a:chOff x="0" y="0"/>
+          <a:chExt cx="0" cy="0"/>
+        </a:xfrm>
+      </p:grpSpPr>
+      <p:sp>
+        <p:nvSpPr>
+          <p:cNvPr id="15" name="Triangle 14">
+            <a:extLst>
+              <a:ext uri="{FF2B5EF4-FFF2-40B4-BE49-F238E27FC236}">
+                <a16:creationId xmlns:a16="http://schemas.microsoft.com/office/drawing/2014/main" id="{DD6B27D6-69AE-B256-C06F-31BDDBD075F2}"/>
+              </a:ext>
+            </a:extLst>
+          </p:cNvPr>
+          <p:cNvSpPr/>
+          <p:nvPr/>
+        </p:nvSpPr>
+        <p:spPr>
+          <a:xfrm rot="10800000">
+            <a:off x="5347382" y="4377185"/>
+            <a:ext cx="3146911" cy="790559"/>
+          </a:xfrm>
+          <a:prstGeom prst="triangle">
+            <a:avLst>
+              <a:gd name="adj" fmla="val 0"/>
+            </a:avLst>
+          </a:prstGeom>
+          <a:gradFill flip="none" rotWithShape="1">
+            <a:gsLst>
+              <a:gs pos="0">
+                <a:schemeClr val="accent6">
+                  <a:lumMod val="20000"/>
+                  <a:lumOff val="80000"/>
+                </a:schemeClr>
+              </a:gs>
+              <a:gs pos="100000">
+                <a:srgbClr val="009F73"/>
+              </a:gs>
+            </a:gsLst>
+            <a:lin ang="10800000" scaled="1"/>
+            <a:tileRect/>
+          </a:gradFill>
+          <a:ln>
+            <a:solidFill>
+              <a:schemeClr val="tx1"/>
+            </a:solidFill>
+          </a:ln>
+        </p:spPr>
+        <p:style>
+          <a:lnRef idx="2">
+            <a:schemeClr val="accent1">
+              <a:shade val="15000"/>
+            </a:schemeClr>
+          </a:lnRef>
+          <a:fillRef idx="1">
+            <a:schemeClr val="accent1"/>
+          </a:fillRef>
+          <a:effectRef idx="0">
+            <a:schemeClr val="accent1"/>
+          </a:effectRef>
+          <a:fontRef idx="minor">
+            <a:schemeClr val="lt1"/>
+          </a:fontRef>
+        </p:style>
+        <p:txBody>
+          <a:bodyPr vert="horz" rtlCol="0" anchor="ctr"/>
+          <a:lstStyle/>
+          <a:p>
+            <a:pPr algn="ctr"/>
+            <a:endParaRPr lang="en-US" dirty="0">
+              <a:solidFill>
+                <a:schemeClr val="tx1"/>
+              </a:solidFill>
+            </a:endParaRPr>
+          </a:p>
+        </p:txBody>
+      </p:sp>
+      <p:sp>
+        <p:nvSpPr>
+          <p:cNvPr id="17" name="Triangle 16">
+            <a:extLst>
+              <a:ext uri="{FF2B5EF4-FFF2-40B4-BE49-F238E27FC236}">
+                <a16:creationId xmlns:a16="http://schemas.microsoft.com/office/drawing/2014/main" id="{6F2DE9E9-3222-DD02-CF3F-10593F2728E4}"/>
+              </a:ext>
+            </a:extLst>
+          </p:cNvPr>
+          <p:cNvSpPr/>
+          <p:nvPr/>
+        </p:nvSpPr>
+        <p:spPr>
+          <a:xfrm flipV="1">
+            <a:off x="2200472" y="4377186"/>
+            <a:ext cx="3146911" cy="790560"/>
+          </a:xfrm>
+          <a:prstGeom prst="triangle">
+            <a:avLst>
+              <a:gd name="adj" fmla="val 0"/>
+            </a:avLst>
+          </a:prstGeom>
+          <a:gradFill flip="none" rotWithShape="1">
+            <a:gsLst>
+              <a:gs pos="0">
+                <a:schemeClr val="accent2">
+                  <a:lumMod val="20000"/>
+                  <a:lumOff val="80000"/>
+                </a:schemeClr>
+              </a:gs>
+              <a:gs pos="100000">
+                <a:srgbClr val="E6A000"/>
+              </a:gs>
+            </a:gsLst>
+            <a:lin ang="10800000" scaled="1"/>
+            <a:tileRect/>
+          </a:gradFill>
+          <a:ln>
+            <a:solidFill>
+              <a:schemeClr val="tx1"/>
+            </a:solidFill>
+          </a:ln>
+        </p:spPr>
+        <p:style>
+          <a:lnRef idx="2">
+            <a:schemeClr val="accent1">
+              <a:shade val="15000"/>
+            </a:schemeClr>
+          </a:lnRef>
+          <a:fillRef idx="1">
+            <a:schemeClr val="accent1"/>
+          </a:fillRef>
+          <a:effectRef idx="0">
+            <a:schemeClr val="accent1"/>
+          </a:effectRef>
+          <a:fontRef idx="minor">
+            <a:schemeClr val="lt1"/>
+          </a:fontRef>
+        </p:style>
+        <p:txBody>
+          <a:bodyPr rtlCol="0" anchor="t" anchorCtr="0"/>
+          <a:lstStyle/>
+          <a:p>
+            <a:pPr algn="ctr"/>
+            <a:endParaRPr lang="en-US" dirty="0">
+              <a:solidFill>
+                <a:schemeClr val="tx1"/>
+              </a:solidFill>
+            </a:endParaRPr>
+          </a:p>
+        </p:txBody>
+      </p:sp>
+      <p:sp>
+        <p:nvSpPr>
+          <p:cNvPr id="18" name="TextBox 17">
+            <a:extLst>
+              <a:ext uri="{FF2B5EF4-FFF2-40B4-BE49-F238E27FC236}">
+                <a16:creationId xmlns:a16="http://schemas.microsoft.com/office/drawing/2014/main" id="{B4555309-FD35-1CC7-B6F4-30681A30923B}"/>
+              </a:ext>
+            </a:extLst>
+          </p:cNvPr>
+          <p:cNvSpPr txBox="1"/>
+          <p:nvPr/>
+        </p:nvSpPr>
+        <p:spPr>
+          <a:xfrm>
+            <a:off x="3303199" y="4317815"/>
+            <a:ext cx="3069108" cy="646331"/>
+          </a:xfrm>
+          <a:prstGeom prst="rect">
+            <a:avLst/>
+          </a:prstGeom>
+          <a:noFill/>
+        </p:spPr>
+        <p:txBody>
+          <a:bodyPr wrap="square" rtlCol="0">
+            <a:spAutoFit/>
+          </a:bodyPr>
+          <a:lstStyle/>
+          <a:p>
+            <a:r>
+              <a:rPr lang="en-US" dirty="0">
+                <a:solidFill>
+                  <a:schemeClr val="tx1"/>
+                </a:solidFill>
+              </a:rPr>
+              <a:t>Negative (-)</a:t>
+            </a:r>
+          </a:p>
+          <a:p>
+            <a:endParaRPr lang="en-US" dirty="0"/>
+          </a:p>
+        </p:txBody>
+      </p:sp>
+      <p:sp>
+        <p:nvSpPr>
+          <p:cNvPr id="19" name="TextBox 18">
+            <a:extLst>
+              <a:ext uri="{FF2B5EF4-FFF2-40B4-BE49-F238E27FC236}">
+                <a16:creationId xmlns:a16="http://schemas.microsoft.com/office/drawing/2014/main" id="{05FE8CD7-BA71-67EA-3A3C-9632BE20B8EA}"/>
+              </a:ext>
+            </a:extLst>
+          </p:cNvPr>
+          <p:cNvSpPr txBox="1"/>
+          <p:nvPr/>
+        </p:nvSpPr>
+        <p:spPr>
+          <a:xfrm>
+            <a:off x="7180764" y="4317814"/>
+            <a:ext cx="3745131" cy="646331"/>
+          </a:xfrm>
+          <a:prstGeom prst="rect">
+            <a:avLst/>
+          </a:prstGeom>
+          <a:noFill/>
+        </p:spPr>
+        <p:txBody>
+          <a:bodyPr wrap="square" rtlCol="0">
+            <a:spAutoFit/>
+          </a:bodyPr>
+          <a:lstStyle/>
+          <a:p>
+            <a:r>
+              <a:rPr lang="en-US" dirty="0">
+                <a:solidFill>
+                  <a:schemeClr val="tx1"/>
+                </a:solidFill>
+              </a:rPr>
+              <a:t>Positive</a:t>
+            </a:r>
+            <a:r>
+              <a:rPr lang="en-US" sz="2000" dirty="0">
+                <a:solidFill>
+                  <a:schemeClr val="tx1"/>
+                </a:solidFill>
+              </a:rPr>
+              <a:t> (+)</a:t>
+            </a:r>
+            <a:endParaRPr lang="en-US" sz="1600" dirty="0">
+              <a:solidFill>
+                <a:schemeClr val="tx1"/>
+              </a:solidFill>
+            </a:endParaRPr>
+          </a:p>
+          <a:p>
+            <a:endParaRPr lang="en-US" sz="1600" dirty="0"/>
+          </a:p>
+        </p:txBody>
+      </p:sp>
+      <p:sp>
+        <p:nvSpPr>
+          <p:cNvPr id="22" name="Rectangle 21">
+            <a:extLst>
+              <a:ext uri="{FF2B5EF4-FFF2-40B4-BE49-F238E27FC236}">
+                <a16:creationId xmlns:a16="http://schemas.microsoft.com/office/drawing/2014/main" id="{611D00C3-D1DC-D7EF-AAB4-E9D45B1A5E87}"/>
+              </a:ext>
+            </a:extLst>
+          </p:cNvPr>
+          <p:cNvSpPr/>
+          <p:nvPr/>
+        </p:nvSpPr>
+        <p:spPr>
+          <a:xfrm>
+            <a:off x="1894470" y="4376460"/>
+            <a:ext cx="1471613" cy="495217"/>
+          </a:xfrm>
+          <a:prstGeom prst="rect">
+            <a:avLst/>
+          </a:prstGeom>
+          <a:solidFill>
+            <a:schemeClr val="bg1"/>
+          </a:solidFill>
+        </p:spPr>
+        <p:style>
+          <a:lnRef idx="2">
+            <a:schemeClr val="accent1">
+              <a:shade val="15000"/>
+            </a:schemeClr>
+          </a:lnRef>
+          <a:fillRef idx="1">
+            <a:schemeClr val="accent1"/>
+          </a:fillRef>
+          <a:effectRef idx="0">
+            <a:schemeClr val="accent1"/>
+          </a:effectRef>
+          <a:fontRef idx="minor">
+            <a:schemeClr val="lt1"/>
+          </a:fontRef>
+        </p:style>
+        <p:txBody>
+          <a:bodyPr rtlCol="0" anchor="ctr"/>
+          <a:lstStyle/>
+          <a:p>
+            <a:pPr algn="ctr"/>
+            <a:endParaRPr lang="en-US"/>
+          </a:p>
+        </p:txBody>
+      </p:sp>
+      <p:sp>
+        <p:nvSpPr>
+          <p:cNvPr id="23" name="Rectangle 22">
+            <a:extLst>
+              <a:ext uri="{FF2B5EF4-FFF2-40B4-BE49-F238E27FC236}">
+                <a16:creationId xmlns:a16="http://schemas.microsoft.com/office/drawing/2014/main" id="{B4F5BCAA-F3E4-7189-2A08-A180F45C62FD}"/>
+              </a:ext>
+            </a:extLst>
+          </p:cNvPr>
+          <p:cNvSpPr/>
+          <p:nvPr/>
+        </p:nvSpPr>
+        <p:spPr>
+          <a:xfrm>
+            <a:off x="1890083" y="4285905"/>
+            <a:ext cx="1476000" cy="1560081"/>
+          </a:xfrm>
+          <a:prstGeom prst="rect">
+            <a:avLst/>
+          </a:prstGeom>
+          <a:solidFill>
+            <a:schemeClr val="bg1"/>
+          </a:solidFill>
+          <a:ln>
+            <a:noFill/>
+          </a:ln>
+        </p:spPr>
+        <p:style>
+          <a:lnRef idx="2">
+            <a:schemeClr val="accent1">
+              <a:shade val="15000"/>
+            </a:schemeClr>
+          </a:lnRef>
+          <a:fillRef idx="1">
+            <a:schemeClr val="accent1"/>
+          </a:fillRef>
+          <a:effectRef idx="0">
+            <a:schemeClr val="accent1"/>
+          </a:effectRef>
+          <a:fontRef idx="minor">
+            <a:schemeClr val="lt1"/>
+          </a:fontRef>
+        </p:style>
+        <p:txBody>
+          <a:bodyPr rtlCol="0" anchor="ctr"/>
+          <a:lstStyle/>
+          <a:p>
+            <a:pPr algn="ctr"/>
+            <a:endParaRPr lang="en-US"/>
+          </a:p>
+        </p:txBody>
+      </p:sp>
+    </p:spTree>
+    <p:extLst>
+      <p:ext uri="{BB962C8B-B14F-4D97-AF65-F5344CB8AC3E}">
+        <p14:creationId xmlns:p14="http://schemas.microsoft.com/office/powerpoint/2010/main" val="190339579"/>
+      </p:ext>
+    </p:extLst>
+  </p:cSld>
+  <p:clrMapOvr>
+    <a:masterClrMapping/>
+  </p:clrMapOvr>
+</p:sld>
+</file>
+
+<file path=ppt/slides/slide3.xml><?xml version="1.0" encoding="utf-8"?>
+<p:sld xmlns:a="http://schemas.openxmlformats.org/drawingml/2006/main" xmlns:r="http://schemas.openxmlformats.org/officeDocument/2006/relationships" xmlns:p="http://schemas.openxmlformats.org/presentationml/2006/main">
+  <p:cSld>
+    <p:spTree>
+      <p:nvGrpSpPr>
+        <p:cNvPr id="1" name=""/>
+        <p:cNvGrpSpPr/>
+        <p:nvPr/>
+      </p:nvGrpSpPr>
+      <p:grpSpPr>
+        <a:xfrm>
+          <a:off x="0" y="0"/>
+          <a:ext cx="0" cy="0"/>
+          <a:chOff x="0" y="0"/>
+          <a:chExt cx="0" cy="0"/>
+        </a:xfrm>
+      </p:grpSpPr>
+      <p:grpSp>
+        <p:nvGrpSpPr>
+          <p:cNvPr id="3" name="Group 2">
+            <a:extLst>
+              <a:ext uri="{FF2B5EF4-FFF2-40B4-BE49-F238E27FC236}">
+                <a16:creationId xmlns:a16="http://schemas.microsoft.com/office/drawing/2014/main" id="{A0EE3B45-E28D-AD7F-3C5B-5FE8F9D542C3}"/>
+              </a:ext>
+            </a:extLst>
+          </p:cNvPr>
+          <p:cNvGrpSpPr/>
+          <p:nvPr/>
+        </p:nvGrpSpPr>
+        <p:grpSpPr>
+          <a:xfrm>
+            <a:off x="1478067" y="1535253"/>
+            <a:ext cx="8225037" cy="919724"/>
+            <a:chOff x="1478068" y="1525837"/>
+            <a:chExt cx="4974633" cy="841775"/>
+          </a:xfrm>
+        </p:grpSpPr>
+        <p:sp>
+          <p:nvSpPr>
+            <p:cNvPr id="4" name="Triangle 3">
+              <a:extLst>
+                <a:ext uri="{FF2B5EF4-FFF2-40B4-BE49-F238E27FC236}">
+                  <a16:creationId xmlns:a16="http://schemas.microsoft.com/office/drawing/2014/main" id="{7487D961-D2CF-D6A3-5FDB-E22993131E6A}"/>
+                </a:ext>
+              </a:extLst>
+            </p:cNvPr>
+            <p:cNvSpPr/>
+            <p:nvPr/>
+          </p:nvSpPr>
+          <p:spPr>
+            <a:xfrm>
+              <a:off x="1478070" y="1525838"/>
+              <a:ext cx="3842075" cy="690889"/>
+            </a:xfrm>
+            <a:prstGeom prst="triangle">
+              <a:avLst>
+                <a:gd name="adj" fmla="val 0"/>
+              </a:avLst>
+            </a:prstGeom>
+            <a:gradFill flip="none" rotWithShape="1">
+              <a:gsLst>
+                <a:gs pos="0">
+                  <a:schemeClr val="accent2">
+                    <a:lumMod val="20000"/>
+                    <a:lumOff val="80000"/>
+                  </a:schemeClr>
+                </a:gs>
+                <a:gs pos="100000">
+                  <a:srgbClr val="E6A000"/>
+                </a:gs>
+              </a:gsLst>
+              <a:lin ang="10800000" scaled="1"/>
+              <a:tileRect/>
+            </a:gradFill>
+            <a:ln>
+              <a:solidFill>
+                <a:schemeClr val="tx1"/>
+              </a:solidFill>
+            </a:ln>
+          </p:spPr>
+          <p:style>
+            <a:lnRef idx="2">
+              <a:schemeClr val="accent1">
+                <a:shade val="15000"/>
+              </a:schemeClr>
+            </a:lnRef>
+            <a:fillRef idx="1">
+              <a:schemeClr val="accent1"/>
+            </a:fillRef>
+            <a:effectRef idx="0">
+              <a:schemeClr val="accent1"/>
+            </a:effectRef>
+            <a:fontRef idx="minor">
+              <a:schemeClr val="lt1"/>
+            </a:fontRef>
+          </p:style>
+          <p:txBody>
+            <a:bodyPr rtlCol="0" anchor="t" anchorCtr="0"/>
+            <a:lstStyle/>
+            <a:p>
+              <a:pPr algn="ctr"/>
+              <a:endParaRPr lang="en-US" dirty="0">
+                <a:solidFill>
+                  <a:schemeClr val="tx1"/>
+                </a:solidFill>
+              </a:endParaRPr>
+            </a:p>
+          </p:txBody>
+        </p:sp>
+        <p:sp>
+          <p:nvSpPr>
+            <p:cNvPr id="5" name="Triangle 4">
+              <a:extLst>
+                <a:ext uri="{FF2B5EF4-FFF2-40B4-BE49-F238E27FC236}">
+                  <a16:creationId xmlns:a16="http://schemas.microsoft.com/office/drawing/2014/main" id="{3DF14EF0-002D-675E-85B7-42D6C69C90BF}"/>
+                </a:ext>
+              </a:extLst>
+            </p:cNvPr>
+            <p:cNvSpPr/>
+            <p:nvPr/>
+          </p:nvSpPr>
+          <p:spPr>
+            <a:xfrm rot="10800000">
+              <a:off x="1478069" y="1525838"/>
+              <a:ext cx="3842075" cy="690889"/>
+            </a:xfrm>
+            <a:prstGeom prst="triangle">
+              <a:avLst>
+                <a:gd name="adj" fmla="val 0"/>
+              </a:avLst>
+            </a:prstGeom>
+            <a:gradFill flip="none" rotWithShape="1">
+              <a:gsLst>
+                <a:gs pos="0">
+                  <a:schemeClr val="accent6">
+                    <a:lumMod val="20000"/>
+                    <a:lumOff val="80000"/>
+                  </a:schemeClr>
+                </a:gs>
+                <a:gs pos="100000">
+                  <a:srgbClr val="009F73"/>
+                </a:gs>
+              </a:gsLst>
+              <a:lin ang="10800000" scaled="1"/>
+              <a:tileRect/>
+            </a:gradFill>
+            <a:ln>
+              <a:solidFill>
+                <a:schemeClr val="tx1"/>
+              </a:solidFill>
+            </a:ln>
+          </p:spPr>
+          <p:style>
+            <a:lnRef idx="2">
+              <a:schemeClr val="accent1">
+                <a:shade val="15000"/>
+              </a:schemeClr>
+            </a:lnRef>
+            <a:fillRef idx="1">
+              <a:schemeClr val="accent1"/>
+            </a:fillRef>
+            <a:effectRef idx="0">
+              <a:schemeClr val="accent1"/>
+            </a:effectRef>
+            <a:fontRef idx="minor">
+              <a:schemeClr val="lt1"/>
+            </a:fontRef>
+          </p:style>
+          <p:txBody>
+            <a:bodyPr vert="horz" rtlCol="0" anchor="ctr"/>
+            <a:lstStyle/>
+            <a:p>
+              <a:pPr algn="ctr"/>
+              <a:endParaRPr lang="en-US" dirty="0">
+                <a:solidFill>
+                  <a:schemeClr val="tx1"/>
+                </a:solidFill>
+              </a:endParaRPr>
+            </a:p>
+          </p:txBody>
+        </p:sp>
+        <p:sp>
+          <p:nvSpPr>
+            <p:cNvPr id="6" name="TextBox 5">
+              <a:extLst>
+                <a:ext uri="{FF2B5EF4-FFF2-40B4-BE49-F238E27FC236}">
+                  <a16:creationId xmlns:a16="http://schemas.microsoft.com/office/drawing/2014/main" id="{A25FE922-EA05-6864-C751-38C382A86884}"/>
+                </a:ext>
+              </a:extLst>
+            </p:cNvPr>
+            <p:cNvSpPr txBox="1"/>
+            <p:nvPr/>
+          </p:nvSpPr>
+          <p:spPr>
+            <a:xfrm>
+              <a:off x="4187586" y="1525837"/>
+              <a:ext cx="2265115" cy="534775"/>
+            </a:xfrm>
+            <a:prstGeom prst="rect">
+              <a:avLst/>
+            </a:prstGeom>
+            <a:noFill/>
+          </p:spPr>
+          <p:txBody>
+            <a:bodyPr wrap="square" rtlCol="0">
+              <a:spAutoFit/>
+            </a:bodyPr>
+            <a:lstStyle/>
+            <a:p>
+              <a:r>
+                <a:rPr lang="en-US" sz="2800" dirty="0">
+                  <a:solidFill>
+                    <a:schemeClr val="tx1"/>
+                  </a:solidFill>
+                </a:rPr>
+                <a:t>Positive (+)</a:t>
+              </a:r>
+              <a:endParaRPr lang="en-US" sz="2000" dirty="0">
+                <a:solidFill>
+                  <a:schemeClr val="tx1"/>
+                </a:solidFill>
+              </a:endParaRPr>
+            </a:p>
+            <a:p>
+              <a:endParaRPr lang="en-US" sz="2000" dirty="0"/>
+            </a:p>
+          </p:txBody>
+        </p:sp>
+        <p:sp>
+          <p:nvSpPr>
+            <p:cNvPr id="2" name="TextBox 1">
+              <a:extLst>
+                <a:ext uri="{FF2B5EF4-FFF2-40B4-BE49-F238E27FC236}">
+                  <a16:creationId xmlns:a16="http://schemas.microsoft.com/office/drawing/2014/main" id="{6B8B6DE7-BCEB-AEAA-9397-6C4116FBE0D3}"/>
+                </a:ext>
+              </a:extLst>
+            </p:cNvPr>
+            <p:cNvSpPr txBox="1"/>
+            <p:nvPr/>
+          </p:nvSpPr>
+          <p:spPr>
+            <a:xfrm>
+              <a:off x="1478068" y="1753611"/>
+              <a:ext cx="2092369" cy="614001"/>
+            </a:xfrm>
+            <a:prstGeom prst="rect">
+              <a:avLst/>
+            </a:prstGeom>
+            <a:noFill/>
+          </p:spPr>
+          <p:txBody>
+            <a:bodyPr wrap="square" rtlCol="0">
+              <a:spAutoFit/>
+            </a:bodyPr>
+            <a:lstStyle/>
+            <a:p>
+              <a:r>
+                <a:rPr lang="en-US" sz="2800" dirty="0">
+                  <a:solidFill>
+                    <a:schemeClr val="tx1"/>
+                  </a:solidFill>
+                </a:rPr>
+                <a:t>Negative (-)</a:t>
+              </a:r>
+            </a:p>
+            <a:p>
+              <a:endParaRPr lang="en-US" sz="2800" dirty="0"/>
+            </a:p>
+          </p:txBody>
+        </p:sp>
+      </p:grpSp>
+    </p:spTree>
+    <p:extLst>
+      <p:ext uri="{BB962C8B-B14F-4D97-AF65-F5344CB8AC3E}">
+        <p14:creationId xmlns:p14="http://schemas.microsoft.com/office/powerpoint/2010/main" val="2525700406"/>
       </p:ext>
     </p:extLst>
   </p:cSld>

</xml_diff>

<commit_message>
adjustement of figures with years
</commit_message>
<xml_diff>
--- a/relatedocuments/Chapt1_conceptualfig.pptx
+++ b/relatedocuments/Chapt1_conceptualfig.pptx
@@ -202,7 +202,7 @@
           <a:p>
             <a:fld id="{385B58D3-3A08-D94A-9131-73EA1863793E}" type="datetimeFigureOut">
               <a:rPr lang="en-US" smtClean="0"/>
-              <a:t>12/11/23</a:t>
+              <a:t>1/15/24</a:t>
             </a:fld>
             <a:endParaRPr lang="en-US"/>
           </a:p>
@@ -787,7 +787,7 @@
           <a:p>
             <a:fld id="{1D8E0F60-F98E-E04E-8062-CC04F8BA2750}" type="datetimeFigureOut">
               <a:rPr lang="en-US" smtClean="0"/>
-              <a:t>12/11/23</a:t>
+              <a:t>1/15/24</a:t>
             </a:fld>
             <a:endParaRPr lang="en-US"/>
           </a:p>
@@ -987,7 +987,7 @@
           <a:p>
             <a:fld id="{1D8E0F60-F98E-E04E-8062-CC04F8BA2750}" type="datetimeFigureOut">
               <a:rPr lang="en-US" smtClean="0"/>
-              <a:t>12/11/23</a:t>
+              <a:t>1/15/24</a:t>
             </a:fld>
             <a:endParaRPr lang="en-US"/>
           </a:p>
@@ -1197,7 +1197,7 @@
           <a:p>
             <a:fld id="{1D8E0F60-F98E-E04E-8062-CC04F8BA2750}" type="datetimeFigureOut">
               <a:rPr lang="en-US" smtClean="0"/>
-              <a:t>12/11/23</a:t>
+              <a:t>1/15/24</a:t>
             </a:fld>
             <a:endParaRPr lang="en-US"/>
           </a:p>
@@ -1397,7 +1397,7 @@
           <a:p>
             <a:fld id="{1D8E0F60-F98E-E04E-8062-CC04F8BA2750}" type="datetimeFigureOut">
               <a:rPr lang="en-US" smtClean="0"/>
-              <a:t>12/11/23</a:t>
+              <a:t>1/15/24</a:t>
             </a:fld>
             <a:endParaRPr lang="en-US"/>
           </a:p>
@@ -1673,7 +1673,7 @@
           <a:p>
             <a:fld id="{1D8E0F60-F98E-E04E-8062-CC04F8BA2750}" type="datetimeFigureOut">
               <a:rPr lang="en-US" smtClean="0"/>
-              <a:t>12/11/23</a:t>
+              <a:t>1/15/24</a:t>
             </a:fld>
             <a:endParaRPr lang="en-US"/>
           </a:p>
@@ -1941,7 +1941,7 @@
           <a:p>
             <a:fld id="{1D8E0F60-F98E-E04E-8062-CC04F8BA2750}" type="datetimeFigureOut">
               <a:rPr lang="en-US" smtClean="0"/>
-              <a:t>12/11/23</a:t>
+              <a:t>1/15/24</a:t>
             </a:fld>
             <a:endParaRPr lang="en-US"/>
           </a:p>
@@ -2356,7 +2356,7 @@
           <a:p>
             <a:fld id="{1D8E0F60-F98E-E04E-8062-CC04F8BA2750}" type="datetimeFigureOut">
               <a:rPr lang="en-US" smtClean="0"/>
-              <a:t>12/11/23</a:t>
+              <a:t>1/15/24</a:t>
             </a:fld>
             <a:endParaRPr lang="en-US"/>
           </a:p>
@@ -2498,7 +2498,7 @@
           <a:p>
             <a:fld id="{1D8E0F60-F98E-E04E-8062-CC04F8BA2750}" type="datetimeFigureOut">
               <a:rPr lang="en-US" smtClean="0"/>
-              <a:t>12/11/23</a:t>
+              <a:t>1/15/24</a:t>
             </a:fld>
             <a:endParaRPr lang="en-US"/>
           </a:p>
@@ -2611,7 +2611,7 @@
           <a:p>
             <a:fld id="{1D8E0F60-F98E-E04E-8062-CC04F8BA2750}" type="datetimeFigureOut">
               <a:rPr lang="en-US" smtClean="0"/>
-              <a:t>12/11/23</a:t>
+              <a:t>1/15/24</a:t>
             </a:fld>
             <a:endParaRPr lang="en-US"/>
           </a:p>
@@ -2924,7 +2924,7 @@
           <a:p>
             <a:fld id="{1D8E0F60-F98E-E04E-8062-CC04F8BA2750}" type="datetimeFigureOut">
               <a:rPr lang="en-US" smtClean="0"/>
-              <a:t>12/11/23</a:t>
+              <a:t>1/15/24</a:t>
             </a:fld>
             <a:endParaRPr lang="en-US"/>
           </a:p>
@@ -3213,7 +3213,7 @@
           <a:p>
             <a:fld id="{1D8E0F60-F98E-E04E-8062-CC04F8BA2750}" type="datetimeFigureOut">
               <a:rPr lang="en-US" smtClean="0"/>
-              <a:t>12/11/23</a:t>
+              <a:t>1/15/24</a:t>
             </a:fld>
             <a:endParaRPr lang="en-US"/>
           </a:p>
@@ -3456,7 +3456,7 @@
           <a:p>
             <a:fld id="{1D8E0F60-F98E-E04E-8062-CC04F8BA2750}" type="datetimeFigureOut">
               <a:rPr lang="en-US" smtClean="0"/>
-              <a:t>12/11/23</a:t>
+              <a:t>1/15/24</a:t>
             </a:fld>
             <a:endParaRPr lang="en-US"/>
           </a:p>
@@ -3916,8 +3916,8 @@
         </p:blipFill>
         <p:spPr>
           <a:xfrm>
-            <a:off x="1069882" y="2399309"/>
-            <a:ext cx="282974" cy="340308"/>
+            <a:off x="1241793" y="2077742"/>
+            <a:ext cx="455388" cy="547655"/>
           </a:xfrm>
           <a:prstGeom prst="rect">
             <a:avLst/>
@@ -4065,8 +4065,8 @@
             <a:solidFill>
               <a:schemeClr val="tx1"/>
             </a:solidFill>
-            <a:headEnd type="triangle"/>
-            <a:tailEnd type="none"/>
+            <a:headEnd type="none"/>
+            <a:tailEnd type="triangle"/>
           </a:ln>
         </p:spPr>
         <p:style>
@@ -4106,8 +4106,8 @@
         </p:blipFill>
         <p:spPr>
           <a:xfrm>
-            <a:off x="-1" y="1789450"/>
-            <a:ext cx="695647" cy="908434"/>
+            <a:off x="13851" y="1413339"/>
+            <a:ext cx="1015617" cy="1326278"/>
           </a:xfrm>
           <a:prstGeom prst="rect">
             <a:avLst/>
@@ -4193,8 +4193,8 @@
             <a:solidFill>
               <a:schemeClr val="tx1"/>
             </a:solidFill>
-            <a:headEnd type="triangle"/>
-            <a:tailEnd type="none"/>
+            <a:headEnd type="none"/>
+            <a:tailEnd type="triangle"/>
           </a:ln>
         </p:spPr>
         <p:style>
@@ -4314,8 +4314,8 @@
             <a:solidFill>
               <a:schemeClr val="tx1"/>
             </a:solidFill>
-            <a:headEnd type="triangle"/>
-            <a:tailEnd type="none"/>
+            <a:headEnd type="none"/>
+            <a:tailEnd type="triangle"/>
           </a:ln>
         </p:spPr>
         <p:style>
@@ -4474,8 +4474,8 @@
             <a:solidFill>
               <a:schemeClr val="tx1"/>
             </a:solidFill>
-            <a:headEnd type="triangle"/>
-            <a:tailEnd type="none"/>
+            <a:headEnd type="none"/>
+            <a:tailEnd type="triangle"/>
           </a:ln>
         </p:spPr>
         <p:style>
@@ -4762,8 +4762,8 @@
         </p:blipFill>
         <p:spPr>
           <a:xfrm>
-            <a:off x="8983818" y="1182971"/>
-            <a:ext cx="695647" cy="908434"/>
+            <a:off x="8939148" y="1138083"/>
+            <a:ext cx="790600" cy="1032432"/>
           </a:xfrm>
           <a:prstGeom prst="rect">
             <a:avLst/>
@@ -4888,8 +4888,8 @@
             <a:solidFill>
               <a:schemeClr val="tx1"/>
             </a:solidFill>
-            <a:headEnd type="triangle"/>
-            <a:tailEnd type="none"/>
+            <a:headEnd type="none"/>
+            <a:tailEnd type="triangle"/>
           </a:ln>
         </p:spPr>
         <p:style>
@@ -4935,8 +4935,8 @@
             <a:solidFill>
               <a:schemeClr val="tx1"/>
             </a:solidFill>
-            <a:headEnd type="triangle"/>
-            <a:tailEnd type="none"/>
+            <a:headEnd type="none"/>
+            <a:tailEnd type="triangle"/>
           </a:ln>
         </p:spPr>
         <p:style>
@@ -4982,8 +4982,8 @@
             <a:solidFill>
               <a:schemeClr val="tx1"/>
             </a:solidFill>
-            <a:headEnd type="triangle"/>
-            <a:tailEnd type="none"/>
+            <a:headEnd type="none"/>
+            <a:tailEnd type="triangle"/>
           </a:ln>
         </p:spPr>
         <p:style>
@@ -5134,8 +5134,8 @@
             <a:solidFill>
               <a:schemeClr val="tx1"/>
             </a:solidFill>
-            <a:headEnd type="triangle"/>
-            <a:tailEnd type="none"/>
+            <a:headEnd type="none"/>
+            <a:tailEnd type="triangle"/>
           </a:ln>
         </p:spPr>
         <p:style>
@@ -5369,8 +5369,8 @@
             <a:solidFill>
               <a:schemeClr val="tx1"/>
             </a:solidFill>
-            <a:headEnd type="triangle"/>
-            <a:tailEnd type="none"/>
+            <a:headEnd type="none"/>
+            <a:tailEnd type="triangle"/>
           </a:ln>
         </p:spPr>
         <p:style>
@@ -5653,8 +5653,8 @@
             <a:solidFill>
               <a:schemeClr val="tx1"/>
             </a:solidFill>
-            <a:headEnd type="triangle"/>
-            <a:tailEnd type="none"/>
+            <a:headEnd type="none"/>
+            <a:tailEnd type="triangle"/>
           </a:ln>
         </p:spPr>
         <p:style>
@@ -5881,37 +5881,8 @@
         </p:blipFill>
         <p:spPr>
           <a:xfrm>
-            <a:off x="9665125" y="2826802"/>
-            <a:ext cx="612145" cy="622800"/>
-          </a:xfrm>
-          <a:prstGeom prst="rect">
-            <a:avLst/>
-          </a:prstGeom>
-        </p:spPr>
-      </p:pic>
-      <p:pic>
-        <p:nvPicPr>
-          <p:cNvPr id="77" name="Picture 76" descr="A close up of a bee&#10;&#10;Description automatically generated">
-            <a:extLst>
-              <a:ext uri="{FF2B5EF4-FFF2-40B4-BE49-F238E27FC236}">
-                <a16:creationId xmlns:a16="http://schemas.microsoft.com/office/drawing/2014/main" id="{162766EE-C537-AE66-D160-69785164DC8E}"/>
-              </a:ext>
-            </a:extLst>
-          </p:cNvPr>
-          <p:cNvPicPr>
-            <a:picLocks noChangeAspect="1"/>
-          </p:cNvPicPr>
-          <p:nvPr/>
-        </p:nvPicPr>
-        <p:blipFill rotWithShape="1">
-          <a:blip r:embed="rId12"/>
-          <a:srcRect l="15648" t="5920"/>
-          <a:stretch/>
-        </p:blipFill>
-        <p:spPr>
-          <a:xfrm rot="19007941">
-            <a:off x="10454717" y="2784865"/>
-            <a:ext cx="478181" cy="480618"/>
+            <a:off x="9590109" y="2773678"/>
+            <a:ext cx="737023" cy="749852"/>
           </a:xfrm>
           <a:prstGeom prst="rect">
             <a:avLst/>
@@ -6107,50 +6078,8 @@
         </p:blipFill>
         <p:spPr>
           <a:xfrm>
-            <a:off x="9614316" y="4891441"/>
-            <a:ext cx="1405591" cy="569897"/>
-          </a:xfrm>
-          <a:prstGeom prst="rect">
-            <a:avLst/>
-          </a:prstGeom>
-        </p:spPr>
-      </p:pic>
-      <p:pic>
-        <p:nvPicPr>
-          <p:cNvPr id="80" name="Picture 79" descr="A yellow caterpillar with red dots&#10;&#10;Description automatically generated">
-            <a:extLst>
-              <a:ext uri="{FF2B5EF4-FFF2-40B4-BE49-F238E27FC236}">
-                <a16:creationId xmlns:a16="http://schemas.microsoft.com/office/drawing/2014/main" id="{5ED095F9-6249-C401-BBD9-549F44B2DA67}"/>
-              </a:ext>
-            </a:extLst>
-          </p:cNvPr>
-          <p:cNvPicPr>
-            <a:picLocks noChangeAspect="1"/>
-          </p:cNvPicPr>
-          <p:nvPr/>
-        </p:nvPicPr>
-        <p:blipFill>
-          <a:blip r:embed="rId13">
-            <a:extLst>
-              <a:ext uri="{BEBA8EAE-BF5A-486C-A8C5-ECC9F3942E4B}">
-                <a14:imgProps xmlns:a14="http://schemas.microsoft.com/office/drawing/2010/main">
-                  <a14:imgLayer r:embed="rId14">
-                    <a14:imgEffect>
-                      <a14:backgroundRemoval t="10000" b="90000" l="10000" r="90000"/>
-                    </a14:imgEffect>
-                  </a14:imgLayer>
-                </a14:imgProps>
-              </a:ext>
-            </a:extLst>
-          </a:blip>
-          <a:stretch>
-            <a:fillRect/>
-          </a:stretch>
-        </p:blipFill>
-        <p:spPr>
-          <a:xfrm rot="2255016">
-            <a:off x="10324666" y="4920912"/>
-            <a:ext cx="907411" cy="423987"/>
+            <a:off x="9498091" y="4661058"/>
+            <a:ext cx="1748094" cy="708765"/>
           </a:xfrm>
           <a:prstGeom prst="rect">
             <a:avLst/>
@@ -6172,7 +6101,9 @@
           <p:nvPr/>
         </p:nvPicPr>
         <p:blipFill>
-          <a:blip r:embed="rId15"/>
+          <a:blip r:embed="rId12">
+            <a:grayscl/>
+          </a:blip>
           <a:stretch>
             <a:fillRect/>
           </a:stretch>
@@ -6257,7 +6188,9 @@
           <p:nvPr/>
         </p:nvPicPr>
         <p:blipFill>
-          <a:blip r:embed="rId16"/>
+          <a:blip r:embed="rId13">
+            <a:grayscl/>
+          </a:blip>
           <a:stretch>
             <a:fillRect/>
           </a:stretch>
@@ -6294,8 +6227,8 @@
         </p:blipFill>
         <p:spPr>
           <a:xfrm>
-            <a:off x="10822684" y="3291723"/>
-            <a:ext cx="695647" cy="908434"/>
+            <a:off x="10711917" y="3124454"/>
+            <a:ext cx="845630" cy="1104294"/>
           </a:xfrm>
           <a:prstGeom prst="rect">
             <a:avLst/>
@@ -6317,14 +6250,16 @@
           <p:nvPr/>
         </p:nvPicPr>
         <p:blipFill>
-          <a:blip r:embed="rId17"/>
+          <a:blip r:embed="rId14">
+            <a:grayscl/>
+          </a:blip>
           <a:stretch>
             <a:fillRect/>
           </a:stretch>
         </p:blipFill>
         <p:spPr>
           <a:xfrm>
-            <a:off x="10785600" y="3789358"/>
+            <a:off x="10830829" y="3834339"/>
             <a:ext cx="533458" cy="620908"/>
           </a:xfrm>
           <a:prstGeom prst="rect">
@@ -6332,8 +6267,8 @@
           </a:prstGeom>
         </p:spPr>
       </p:pic>
-      <mc:AlternateContent xmlns:mc="http://schemas.openxmlformats.org/markup-compatibility/2006" xmlns:a14="http://schemas.microsoft.com/office/drawing/2010/main">
-        <mc:Choice Requires="a14">
+      <mc:AlternateContent xmlns:mc="http://schemas.openxmlformats.org/markup-compatibility/2006">
+        <mc:Choice xmlns:a14="http://schemas.microsoft.com/office/drawing/2010/main" Requires="a14">
           <p:sp>
             <p:nvSpPr>
               <p:cNvPr id="98" name="TextBox 97">
@@ -6348,7 +6283,7 @@
             </p:nvSpPr>
             <p:spPr>
               <a:xfrm>
-                <a:off x="147065" y="4356396"/>
+                <a:off x="188668" y="4281787"/>
                 <a:ext cx="8352735" cy="2491901"/>
               </a:xfrm>
               <a:prstGeom prst="rect">
@@ -6636,7 +6571,7 @@
             </p:txBody>
           </p:sp>
         </mc:Choice>
-        <mc:Fallback xmlns="">
+        <mc:Fallback>
           <p:sp>
             <p:nvSpPr>
               <p:cNvPr id="98" name="TextBox 97">
@@ -6653,16 +6588,16 @@
             </p:nvSpPr>
             <p:spPr>
               <a:xfrm>
-                <a:off x="147065" y="4356396"/>
+                <a:off x="188668" y="4281787"/>
                 <a:ext cx="8352735" cy="2491901"/>
               </a:xfrm>
               <a:prstGeom prst="rect">
                 <a:avLst/>
               </a:prstGeom>
               <a:blipFill>
-                <a:blip r:embed="rId18"/>
+                <a:blip r:embed="rId15"/>
                 <a:stretch>
-                  <a:fillRect l="-303" t="-508" b="-2538"/>
+                  <a:fillRect l="-303" b="-3030"/>
                 </a:stretch>
               </a:blipFill>
             </p:spPr>
@@ -7165,6 +7100,64 @@
           </a:p>
         </p:txBody>
       </p:sp>
+      <p:pic>
+        <p:nvPicPr>
+          <p:cNvPr id="12" name="Picture 11" descr="A black background with a black square&#10;&#10;Description automatically generated with medium confidence">
+            <a:extLst>
+              <a:ext uri="{FF2B5EF4-FFF2-40B4-BE49-F238E27FC236}">
+                <a16:creationId xmlns:a16="http://schemas.microsoft.com/office/drawing/2014/main" id="{9E9B061E-36D7-6355-8E97-4B4AB8A78E3A}"/>
+              </a:ext>
+            </a:extLst>
+          </p:cNvPr>
+          <p:cNvPicPr>
+            <a:picLocks noChangeAspect="1"/>
+          </p:cNvPicPr>
+          <p:nvPr/>
+        </p:nvPicPr>
+        <p:blipFill rotWithShape="1">
+          <a:blip r:embed="rId21"/>
+          <a:srcRect b="11945"/>
+          <a:stretch/>
+        </p:blipFill>
+        <p:spPr>
+          <a:xfrm rot="1692493">
+            <a:off x="10723344" y="2436864"/>
+            <a:ext cx="556326" cy="489872"/>
+          </a:xfrm>
+          <a:prstGeom prst="rect">
+            <a:avLst/>
+          </a:prstGeom>
+        </p:spPr>
+      </p:pic>
+      <p:pic>
+        <p:nvPicPr>
+          <p:cNvPr id="17" name="Picture 16" descr="A black background with a black square&#10;&#10;Description automatically generated with medium confidence">
+            <a:extLst>
+              <a:ext uri="{FF2B5EF4-FFF2-40B4-BE49-F238E27FC236}">
+                <a16:creationId xmlns:a16="http://schemas.microsoft.com/office/drawing/2014/main" id="{7B47C1E1-616C-30C5-4ECD-3B7AD84A5D13}"/>
+              </a:ext>
+            </a:extLst>
+          </p:cNvPr>
+          <p:cNvPicPr>
+            <a:picLocks noChangeAspect="1"/>
+          </p:cNvPicPr>
+          <p:nvPr/>
+        </p:nvPicPr>
+        <p:blipFill rotWithShape="1">
+          <a:blip r:embed="rId22"/>
+          <a:srcRect b="35657"/>
+          <a:stretch/>
+        </p:blipFill>
+        <p:spPr>
+          <a:xfrm rot="1243316">
+            <a:off x="9563773" y="4523086"/>
+            <a:ext cx="1207808" cy="777147"/>
+          </a:xfrm>
+          <a:prstGeom prst="rect">
+            <a:avLst/>
+          </a:prstGeom>
+        </p:spPr>
+      </p:pic>
     </p:spTree>
     <p:extLst>
       <p:ext uri="{BB962C8B-B14F-4D97-AF65-F5344CB8AC3E}">

</xml_diff>

<commit_message>
readjustement figures and parameters
</commit_message>
<xml_diff>
--- a/relatedocuments/Chapt1_conceptualfig.pptx
+++ b/relatedocuments/Chapt1_conceptualfig.pptx
@@ -202,7 +202,7 @@
           <a:p>
             <a:fld id="{385B58D3-3A08-D94A-9131-73EA1863793E}" type="datetimeFigureOut">
               <a:rPr lang="en-US" smtClean="0"/>
-              <a:t>1/15/24</a:t>
+              <a:t>3/26/24</a:t>
             </a:fld>
             <a:endParaRPr lang="en-US"/>
           </a:p>
@@ -787,7 +787,7 @@
           <a:p>
             <a:fld id="{1D8E0F60-F98E-E04E-8062-CC04F8BA2750}" type="datetimeFigureOut">
               <a:rPr lang="en-US" smtClean="0"/>
-              <a:t>1/15/24</a:t>
+              <a:t>3/26/24</a:t>
             </a:fld>
             <a:endParaRPr lang="en-US"/>
           </a:p>
@@ -987,7 +987,7 @@
           <a:p>
             <a:fld id="{1D8E0F60-F98E-E04E-8062-CC04F8BA2750}" type="datetimeFigureOut">
               <a:rPr lang="en-US" smtClean="0"/>
-              <a:t>1/15/24</a:t>
+              <a:t>3/26/24</a:t>
             </a:fld>
             <a:endParaRPr lang="en-US"/>
           </a:p>
@@ -1197,7 +1197,7 @@
           <a:p>
             <a:fld id="{1D8E0F60-F98E-E04E-8062-CC04F8BA2750}" type="datetimeFigureOut">
               <a:rPr lang="en-US" smtClean="0"/>
-              <a:t>1/15/24</a:t>
+              <a:t>3/26/24</a:t>
             </a:fld>
             <a:endParaRPr lang="en-US"/>
           </a:p>
@@ -1397,7 +1397,7 @@
           <a:p>
             <a:fld id="{1D8E0F60-F98E-E04E-8062-CC04F8BA2750}" type="datetimeFigureOut">
               <a:rPr lang="en-US" smtClean="0"/>
-              <a:t>1/15/24</a:t>
+              <a:t>3/26/24</a:t>
             </a:fld>
             <a:endParaRPr lang="en-US"/>
           </a:p>
@@ -1673,7 +1673,7 @@
           <a:p>
             <a:fld id="{1D8E0F60-F98E-E04E-8062-CC04F8BA2750}" type="datetimeFigureOut">
               <a:rPr lang="en-US" smtClean="0"/>
-              <a:t>1/15/24</a:t>
+              <a:t>3/26/24</a:t>
             </a:fld>
             <a:endParaRPr lang="en-US"/>
           </a:p>
@@ -1941,7 +1941,7 @@
           <a:p>
             <a:fld id="{1D8E0F60-F98E-E04E-8062-CC04F8BA2750}" type="datetimeFigureOut">
               <a:rPr lang="en-US" smtClean="0"/>
-              <a:t>1/15/24</a:t>
+              <a:t>3/26/24</a:t>
             </a:fld>
             <a:endParaRPr lang="en-US"/>
           </a:p>
@@ -2356,7 +2356,7 @@
           <a:p>
             <a:fld id="{1D8E0F60-F98E-E04E-8062-CC04F8BA2750}" type="datetimeFigureOut">
               <a:rPr lang="en-US" smtClean="0"/>
-              <a:t>1/15/24</a:t>
+              <a:t>3/26/24</a:t>
             </a:fld>
             <a:endParaRPr lang="en-US"/>
           </a:p>
@@ -2498,7 +2498,7 @@
           <a:p>
             <a:fld id="{1D8E0F60-F98E-E04E-8062-CC04F8BA2750}" type="datetimeFigureOut">
               <a:rPr lang="en-US" smtClean="0"/>
-              <a:t>1/15/24</a:t>
+              <a:t>3/26/24</a:t>
             </a:fld>
             <a:endParaRPr lang="en-US"/>
           </a:p>
@@ -2611,7 +2611,7 @@
           <a:p>
             <a:fld id="{1D8E0F60-F98E-E04E-8062-CC04F8BA2750}" type="datetimeFigureOut">
               <a:rPr lang="en-US" smtClean="0"/>
-              <a:t>1/15/24</a:t>
+              <a:t>3/26/24</a:t>
             </a:fld>
             <a:endParaRPr lang="en-US"/>
           </a:p>
@@ -2924,7 +2924,7 @@
           <a:p>
             <a:fld id="{1D8E0F60-F98E-E04E-8062-CC04F8BA2750}" type="datetimeFigureOut">
               <a:rPr lang="en-US" smtClean="0"/>
-              <a:t>1/15/24</a:t>
+              <a:t>3/26/24</a:t>
             </a:fld>
             <a:endParaRPr lang="en-US"/>
           </a:p>
@@ -3213,7 +3213,7 @@
           <a:p>
             <a:fld id="{1D8E0F60-F98E-E04E-8062-CC04F8BA2750}" type="datetimeFigureOut">
               <a:rPr lang="en-US" smtClean="0"/>
-              <a:t>1/15/24</a:t>
+              <a:t>3/26/24</a:t>
             </a:fld>
             <a:endParaRPr lang="en-US"/>
           </a:p>
@@ -3456,7 +3456,7 @@
           <a:p>
             <a:fld id="{1D8E0F60-F98E-E04E-8062-CC04F8BA2750}" type="datetimeFigureOut">
               <a:rPr lang="en-US" smtClean="0"/>
-              <a:t>1/15/24</a:t>
+              <a:t>3/26/24</a:t>
             </a:fld>
             <a:endParaRPr lang="en-US"/>
           </a:p>
@@ -6267,8 +6267,8 @@
           </a:prstGeom>
         </p:spPr>
       </p:pic>
-      <mc:AlternateContent xmlns:mc="http://schemas.openxmlformats.org/markup-compatibility/2006">
-        <mc:Choice xmlns:a14="http://schemas.microsoft.com/office/drawing/2010/main" Requires="a14">
+      <mc:AlternateContent xmlns:mc="http://schemas.openxmlformats.org/markup-compatibility/2006" xmlns:a14="http://schemas.microsoft.com/office/drawing/2010/main">
+        <mc:Choice Requires="a14">
           <p:sp>
             <p:nvSpPr>
               <p:cNvPr id="98" name="TextBox 97">
@@ -6571,7 +6571,7 @@
             </p:txBody>
           </p:sp>
         </mc:Choice>
-        <mc:Fallback>
+        <mc:Fallback xmlns="">
           <p:sp>
             <p:nvSpPr>
               <p:cNvPr id="98" name="TextBox 97">
@@ -7346,7 +7346,7 @@
         </p:nvSpPr>
         <p:spPr>
           <a:xfrm>
-            <a:off x="3303199" y="4317815"/>
+            <a:off x="2200471" y="4317813"/>
             <a:ext cx="3069108" cy="646331"/>
           </a:xfrm>
           <a:prstGeom prst="rect">
@@ -7426,107 +7426,6 @@
           </a:p>
           <a:p>
             <a:endParaRPr lang="en-US" sz="1600" dirty="0"/>
-          </a:p>
-        </p:txBody>
-      </p:sp>
-      <p:sp>
-        <p:nvSpPr>
-          <p:cNvPr id="22" name="Rectangle 21">
-            <a:extLst>
-              <a:ext uri="{FF2B5EF4-FFF2-40B4-BE49-F238E27FC236}">
-                <a16:creationId xmlns:a16="http://schemas.microsoft.com/office/drawing/2014/main" id="{611D00C3-D1DC-D7EF-AAB4-E9D45B1A5E87}"/>
-              </a:ext>
-            </a:extLst>
-          </p:cNvPr>
-          <p:cNvSpPr/>
-          <p:nvPr/>
-        </p:nvSpPr>
-        <p:spPr>
-          <a:xfrm>
-            <a:off x="1894470" y="4376460"/>
-            <a:ext cx="1471613" cy="495217"/>
-          </a:xfrm>
-          <a:prstGeom prst="rect">
-            <a:avLst/>
-          </a:prstGeom>
-          <a:solidFill>
-            <a:schemeClr val="bg1"/>
-          </a:solidFill>
-        </p:spPr>
-        <p:style>
-          <a:lnRef idx="2">
-            <a:schemeClr val="accent1">
-              <a:shade val="15000"/>
-            </a:schemeClr>
-          </a:lnRef>
-          <a:fillRef idx="1">
-            <a:schemeClr val="accent1"/>
-          </a:fillRef>
-          <a:effectRef idx="0">
-            <a:schemeClr val="accent1"/>
-          </a:effectRef>
-          <a:fontRef idx="minor">
-            <a:schemeClr val="lt1"/>
-          </a:fontRef>
-        </p:style>
-        <p:txBody>
-          <a:bodyPr rtlCol="0" anchor="ctr"/>
-          <a:lstStyle/>
-          <a:p>
-            <a:pPr algn="ctr"/>
-            <a:endParaRPr lang="en-US"/>
-          </a:p>
-        </p:txBody>
-      </p:sp>
-      <p:sp>
-        <p:nvSpPr>
-          <p:cNvPr id="23" name="Rectangle 22">
-            <a:extLst>
-              <a:ext uri="{FF2B5EF4-FFF2-40B4-BE49-F238E27FC236}">
-                <a16:creationId xmlns:a16="http://schemas.microsoft.com/office/drawing/2014/main" id="{B4F5BCAA-F3E4-7189-2A08-A180F45C62FD}"/>
-              </a:ext>
-            </a:extLst>
-          </p:cNvPr>
-          <p:cNvSpPr/>
-          <p:nvPr/>
-        </p:nvSpPr>
-        <p:spPr>
-          <a:xfrm>
-            <a:off x="1890083" y="4285905"/>
-            <a:ext cx="1476000" cy="1560081"/>
-          </a:xfrm>
-          <a:prstGeom prst="rect">
-            <a:avLst/>
-          </a:prstGeom>
-          <a:solidFill>
-            <a:schemeClr val="bg1"/>
-          </a:solidFill>
-          <a:ln>
-            <a:noFill/>
-          </a:ln>
-        </p:spPr>
-        <p:style>
-          <a:lnRef idx="2">
-            <a:schemeClr val="accent1">
-              <a:shade val="15000"/>
-            </a:schemeClr>
-          </a:lnRef>
-          <a:fillRef idx="1">
-            <a:schemeClr val="accent1"/>
-          </a:fillRef>
-          <a:effectRef idx="0">
-            <a:schemeClr val="accent1"/>
-          </a:effectRef>
-          <a:fontRef idx="minor">
-            <a:schemeClr val="lt1"/>
-          </a:fontRef>
-        </p:style>
-        <p:txBody>
-          <a:bodyPr rtlCol="0" anchor="ctr"/>
-          <a:lstStyle/>
-          <a:p>
-            <a:pPr algn="ctr"/>
-            <a:endParaRPr lang="en-US"/>
           </a:p>
         </p:txBody>
       </p:sp>

</xml_diff>